<commit_message>
atualização do slide de resultados
</commit_message>
<xml_diff>
--- a/Projeto-AjudeMais/002-Acompanhamento/Iteracao-04/ADR - apresentacao de resultados-IT04.pptx
+++ b/Projeto-AjudeMais/002-Acompanhamento/Iteracao-04/ADR - apresentacao de resultados-IT04.pptx
@@ -4590,6 +4590,103 @@
           </a:p>
         </p:txBody>
       </p:sp>
+      <p:sp>
+        <p:nvSpPr>
+          <p:cNvPr id="83" name="CustomShape 2"/>
+          <p:cNvSpPr/>
+          <p:nvPr/>
+        </p:nvSpPr>
+        <p:spPr>
+          <a:xfrm>
+            <a:off x="337185" y="1756410"/>
+            <a:ext cx="8539920" cy="4522680"/>
+          </a:xfrm>
+          <a:prstGeom prst="rect">
+            <a:avLst/>
+          </a:prstGeom>
+          <a:noFill/>
+          <a:ln>
+            <a:noFill/>
+          </a:ln>
+        </p:spPr>
+        <p:style>
+          <a:lnRef idx="0">
+            <a:srgbClr val="FFFFFF"/>
+          </a:lnRef>
+          <a:fillRef idx="0">
+            <a:srgbClr val="FFFFFF"/>
+          </a:fillRef>
+          <a:effectRef idx="0">
+            <a:srgbClr val="FFFFFF"/>
+          </a:effectRef>
+          <a:fontRef idx="minor"/>
+        </p:style>
+        <p:txBody>
+          <a:bodyPr lIns="90000" tIns="45000" rIns="90000" bIns="45000"/>
+          <a:p>
+            <a:pPr marL="288925" indent="-285750" algn="just">
+              <a:lnSpc>
+                <a:spcPct val="100000"/>
+              </a:lnSpc>
+              <a:buClr>
+                <a:srgbClr val="000000"/>
+              </a:buClr>
+              <a:buSzPct val="45000"/>
+              <a:buFont typeface="Arial" charset="0"/>
+              <a:buChar char="•"/>
+            </a:pPr>
+            <a:r>
+              <a:rPr lang="x-none" altLang="pt-BR" sz="2800" b="0" strike="noStrike" spc="-1">
+                <a:solidFill>
+                  <a:srgbClr val="000000"/>
+                </a:solidFill>
+                <a:uFill>
+                  <a:solidFill>
+                    <a:srgbClr val="FFFFFF"/>
+                  </a:solidFill>
+                </a:uFill>
+                <a:latin typeface="Arial" charset="0"/>
+              </a:rPr>
+              <a:t>Verificar atividades dos demais membros e manter código atualizado, a fim de evitar conflitos de versão do código.</a:t>
+            </a:r>
+            <a:endParaRPr lang="x-none" altLang="pt-BR" sz="2800" b="0" strike="noStrike" spc="-1">
+              <a:solidFill>
+                <a:srgbClr val="000000"/>
+              </a:solidFill>
+              <a:uFill>
+                <a:solidFill>
+                  <a:srgbClr val="FFFFFF"/>
+                </a:solidFill>
+              </a:uFill>
+              <a:latin typeface="Arial" charset="0"/>
+            </a:endParaRPr>
+          </a:p>
+          <a:p>
+            <a:pPr marL="288925" indent="-285750" algn="just">
+              <a:lnSpc>
+                <a:spcPct val="100000"/>
+              </a:lnSpc>
+              <a:buClr>
+                <a:srgbClr val="000000"/>
+              </a:buClr>
+              <a:buSzPct val="45000"/>
+              <a:buFont typeface="Arial" charset="0"/>
+              <a:buChar char="•"/>
+            </a:pPr>
+            <a:endParaRPr lang="pt-BR" sz="2800" b="0" strike="noStrike" spc="-1">
+              <a:solidFill>
+                <a:srgbClr val="000000"/>
+              </a:solidFill>
+              <a:uFill>
+                <a:solidFill>
+                  <a:srgbClr val="FFFFFF"/>
+                </a:solidFill>
+              </a:uFill>
+              <a:latin typeface="Arial" charset="0"/>
+            </a:endParaRPr>
+          </a:p>
+        </p:txBody>
+      </p:sp>
     </p:spTree>
   </p:cSld>
   <p:clrMapOvr>
@@ -5849,7 +5946,7 @@
         </p:nvSpPr>
         <p:spPr>
           <a:xfrm>
-            <a:off x="457200" y="274680"/>
+            <a:off x="456565" y="290555"/>
             <a:ext cx="8226360" cy="1139760"/>
           </a:xfrm>
           <a:prstGeom prst="rect">

</xml_diff>